<commit_message>
video link added to ppt
</commit_message>
<xml_diff>
--- a/Review1/CIP_5010-5018-5125_review1.pptx
+++ b/Review1/CIP_5010-5018-5125_review1.pptx
@@ -8803,6 +8803,62 @@
           <a:bodyPr/>
           <a:lstStyle/>
           <a:p>
+            <a:pPr marL="0" indent="0">
+              <a:buNone/>
+            </a:pPr>
+            <a:endParaRPr lang="en-IN" dirty="0"/>
+          </a:p>
+          <a:p>
+            <a:pPr marL="0" indent="0">
+              <a:buNone/>
+            </a:pPr>
+            <a:r>
+              <a:rPr lang="en-IN" dirty="0" err="1"/>
+              <a:t>Github</a:t>
+            </a:r>
+            <a:r>
+              <a:rPr lang="en-IN" dirty="0"/>
+              <a:t> Link: </a:t>
+            </a:r>
+          </a:p>
+          <a:p>
+            <a:pPr marL="0" indent="0">
+              <a:buNone/>
+            </a:pPr>
+            <a:r>
+              <a:rPr lang="en-IN" sz="2000" dirty="0">
+                <a:hlinkClick r:id="rId2"/>
+              </a:rPr>
+              <a:t>https://github.com/DIST-projects/cip_2021_bama_ma-am_batch-5010_5018_5125/blob/main/Review1/Demo-video.mp4</a:t>
+            </a:r>
+            <a:endParaRPr lang="en-IN" sz="2000" dirty="0"/>
+          </a:p>
+          <a:p>
+            <a:pPr marL="0" indent="0">
+              <a:buNone/>
+            </a:pPr>
+            <a:endParaRPr lang="en-IN" dirty="0"/>
+          </a:p>
+          <a:p>
+            <a:pPr marL="0" indent="0">
+              <a:buNone/>
+            </a:pPr>
+            <a:r>
+              <a:rPr lang="en-IN" dirty="0"/>
+              <a:t>Drive Link: </a:t>
+            </a:r>
+            <a:r>
+              <a:rPr lang="en-IN" sz="2400" dirty="0">
+                <a:hlinkClick r:id="rId3"/>
+              </a:rPr>
+              <a:t>https://drive.google.com/file/d/19MOZ0Gb1oFsqMpWPIGrMvnq1RPqzML7p/view?usp=sharing</a:t>
+            </a:r>
+            <a:endParaRPr lang="en-IN" sz="2400" dirty="0"/>
+          </a:p>
+          <a:p>
+            <a:pPr marL="0" indent="0">
+              <a:buNone/>
+            </a:pPr>
             <a:endParaRPr lang="en-IN" dirty="0"/>
           </a:p>
         </p:txBody>

</xml_diff>

<commit_message>
report completed and pushed
</commit_message>
<xml_diff>
--- a/Review1/CIP_5010-5018-5125_review1.pptx
+++ b/Review1/CIP_5010-5018-5125_review1.pptx
@@ -16,6 +16,7 @@
     <p:sldId id="264" r:id="rId10"/>
     <p:sldId id="265" r:id="rId11"/>
     <p:sldId id="266" r:id="rId12"/>
+    <p:sldId id="267" r:id="rId13"/>
   </p:sldIdLst>
   <p:sldSz cx="12192000" cy="6858000"/>
   <p:notesSz cx="6858000" cy="9144000"/>
@@ -253,7 +254,7 @@
           <a:p>
             <a:fld id="{FD8CB1F8-EF27-48FF-98E1-3423E024F1F7}" type="datetimeFigureOut">
               <a:rPr lang="en-IN" smtClean="0"/>
-              <a:t>23-04-2021</a:t>
+              <a:t>06-05-2021</a:t>
             </a:fld>
             <a:endParaRPr lang="en-IN"/>
           </a:p>
@@ -423,7 +424,7 @@
           <a:p>
             <a:fld id="{FD8CB1F8-EF27-48FF-98E1-3423E024F1F7}" type="datetimeFigureOut">
               <a:rPr lang="en-IN" smtClean="0"/>
-              <a:t>23-04-2021</a:t>
+              <a:t>06-05-2021</a:t>
             </a:fld>
             <a:endParaRPr lang="en-IN"/>
           </a:p>
@@ -603,7 +604,7 @@
           <a:p>
             <a:fld id="{FD8CB1F8-EF27-48FF-98E1-3423E024F1F7}" type="datetimeFigureOut">
               <a:rPr lang="en-IN" smtClean="0"/>
-              <a:t>23-04-2021</a:t>
+              <a:t>06-05-2021</a:t>
             </a:fld>
             <a:endParaRPr lang="en-IN"/>
           </a:p>
@@ -827,7 +828,7 @@
             <a:fld id="{11A6662E-FAF4-44BC-88B5-85A7CBFB6D30}" type="datetime1">
               <a:rPr lang="en-US" smtClean="0"/>
               <a:pPr/>
-              <a:t>4/23/2021</a:t>
+              <a:t>5/6/2021</a:t>
             </a:fld>
             <a:endParaRPr lang="en-US" dirty="0"/>
           </a:p>
@@ -1061,7 +1062,7 @@
           <a:p>
             <a:fld id="{0055F08A-1E71-4B2B-BB49-E743F2903911}" type="datetime1">
               <a:rPr lang="en-US" smtClean="0"/>
-              <a:t>4/23/2021</a:t>
+              <a:t>5/6/2021</a:t>
             </a:fld>
             <a:endParaRPr lang="en-US" dirty="0"/>
           </a:p>
@@ -1335,7 +1336,7 @@
           <a:p>
             <a:fld id="{15417D9E-721A-44BB-8863-9873FE64DA75}" type="datetime1">
               <a:rPr lang="en-US" smtClean="0"/>
-              <a:t>4/23/2021</a:t>
+              <a:t>5/6/2021</a:t>
             </a:fld>
             <a:endParaRPr lang="en-US"/>
           </a:p>
@@ -1608,7 +1609,7 @@
           <a:p>
             <a:fld id="{5F31DA2F-80B8-49CF-99FB-5ABCA53A607A}" type="datetime1">
               <a:rPr lang="en-US" smtClean="0"/>
-              <a:t>4/23/2021</a:t>
+              <a:t>5/6/2021</a:t>
             </a:fld>
             <a:endParaRPr lang="en-US"/>
           </a:p>
@@ -2023,7 +2024,7 @@
           <a:p>
             <a:fld id="{28852172-E6C9-4B6C-929A-A9DE3837BBF1}" type="datetime1">
               <a:rPr lang="en-US" smtClean="0"/>
-              <a:t>4/23/2021</a:t>
+              <a:t>5/6/2021</a:t>
             </a:fld>
             <a:endParaRPr lang="en-US"/>
           </a:p>
@@ -2175,7 +2176,7 @@
           <a:p>
             <a:fld id="{3AB41CFF-90C9-47B3-9DA1-F2BF8D839F7E}" type="datetime1">
               <a:rPr lang="en-US" smtClean="0"/>
-              <a:t>4/23/2021</a:t>
+              <a:t>5/6/2021</a:t>
             </a:fld>
             <a:endParaRPr lang="en-US"/>
           </a:p>
@@ -2288,7 +2289,7 @@
           <a:p>
             <a:fld id="{F06048FA-06AB-4884-A69B-986B96E68A24}" type="datetime1">
               <a:rPr lang="en-US" smtClean="0"/>
-              <a:t>4/23/2021</a:t>
+              <a:t>5/6/2021</a:t>
             </a:fld>
             <a:endParaRPr lang="en-US"/>
           </a:p>
@@ -2599,7 +2600,7 @@
           <a:p>
             <a:fld id="{50DB7ABA-0172-4F9C-889D-567164F66BCD}" type="datetime1">
               <a:rPr lang="en-US" smtClean="0"/>
-              <a:t>4/23/2021</a:t>
+              <a:t>5/6/2021</a:t>
             </a:fld>
             <a:endParaRPr lang="en-US"/>
           </a:p>
@@ -2781,7 +2782,7 @@
           <a:p>
             <a:fld id="{FD8CB1F8-EF27-48FF-98E1-3423E024F1F7}" type="datetimeFigureOut">
               <a:rPr lang="en-IN" smtClean="0"/>
-              <a:t>23-04-2021</a:t>
+              <a:t>06-05-2021</a:t>
             </a:fld>
             <a:endParaRPr lang="en-IN"/>
           </a:p>
@@ -3060,7 +3061,7 @@
           <a:p>
             <a:fld id="{78AC6A5B-8AE7-4A41-B5A7-9ADC6686DC18}" type="datetime1">
               <a:rPr lang="en-US" smtClean="0"/>
-              <a:t>4/23/2021</a:t>
+              <a:t>5/6/2021</a:t>
             </a:fld>
             <a:endParaRPr lang="en-US"/>
           </a:p>
@@ -3258,7 +3259,7 @@
           <a:p>
             <a:fld id="{4C559632-1575-4E14-B53B-3DC3D5ED3947}" type="datetime1">
               <a:rPr lang="en-US" smtClean="0"/>
-              <a:t>4/23/2021</a:t>
+              <a:t>5/6/2021</a:t>
             </a:fld>
             <a:endParaRPr lang="en-US"/>
           </a:p>
@@ -3466,7 +3467,7 @@
           <a:p>
             <a:fld id="{CC4A6868-2568-4CC9-B302-F37117B01A6E}" type="datetime1">
               <a:rPr lang="en-US" smtClean="0"/>
-              <a:t>4/23/2021</a:t>
+              <a:t>5/6/2021</a:t>
             </a:fld>
             <a:endParaRPr lang="en-US"/>
           </a:p>
@@ -3724,7 +3725,7 @@
           <a:p>
             <a:fld id="{FD8CB1F8-EF27-48FF-98E1-3423E024F1F7}" type="datetimeFigureOut">
               <a:rPr lang="en-IN" smtClean="0"/>
-              <a:t>23-04-2021</a:t>
+              <a:t>06-05-2021</a:t>
             </a:fld>
             <a:endParaRPr lang="en-IN"/>
           </a:p>
@@ -3956,7 +3957,7 @@
           <a:p>
             <a:fld id="{FD8CB1F8-EF27-48FF-98E1-3423E024F1F7}" type="datetimeFigureOut">
               <a:rPr lang="en-IN" smtClean="0"/>
-              <a:t>23-04-2021</a:t>
+              <a:t>06-05-2021</a:t>
             </a:fld>
             <a:endParaRPr lang="en-IN"/>
           </a:p>
@@ -4323,7 +4324,7 @@
           <a:p>
             <a:fld id="{FD8CB1F8-EF27-48FF-98E1-3423E024F1F7}" type="datetimeFigureOut">
               <a:rPr lang="en-IN" smtClean="0"/>
-              <a:t>23-04-2021</a:t>
+              <a:t>06-05-2021</a:t>
             </a:fld>
             <a:endParaRPr lang="en-IN"/>
           </a:p>
@@ -4441,7 +4442,7 @@
           <a:p>
             <a:fld id="{FD8CB1F8-EF27-48FF-98E1-3423E024F1F7}" type="datetimeFigureOut">
               <a:rPr lang="en-IN" smtClean="0"/>
-              <a:t>23-04-2021</a:t>
+              <a:t>06-05-2021</a:t>
             </a:fld>
             <a:endParaRPr lang="en-IN"/>
           </a:p>
@@ -4536,7 +4537,7 @@
           <a:p>
             <a:fld id="{FD8CB1F8-EF27-48FF-98E1-3423E024F1F7}" type="datetimeFigureOut">
               <a:rPr lang="en-IN" smtClean="0"/>
-              <a:t>23-04-2021</a:t>
+              <a:t>06-05-2021</a:t>
             </a:fld>
             <a:endParaRPr lang="en-IN"/>
           </a:p>
@@ -4813,7 +4814,7 @@
           <a:p>
             <a:fld id="{FD8CB1F8-EF27-48FF-98E1-3423E024F1F7}" type="datetimeFigureOut">
               <a:rPr lang="en-IN" smtClean="0"/>
-              <a:t>23-04-2021</a:t>
+              <a:t>06-05-2021</a:t>
             </a:fld>
             <a:endParaRPr lang="en-IN"/>
           </a:p>
@@ -5070,7 +5071,7 @@
           <a:p>
             <a:fld id="{FD8CB1F8-EF27-48FF-98E1-3423E024F1F7}" type="datetimeFigureOut">
               <a:rPr lang="en-IN" smtClean="0"/>
-              <a:t>23-04-2021</a:t>
+              <a:t>06-05-2021</a:t>
             </a:fld>
             <a:endParaRPr lang="en-IN"/>
           </a:p>
@@ -5283,7 +5284,7 @@
           <a:p>
             <a:fld id="{FD8CB1F8-EF27-48FF-98E1-3423E024F1F7}" type="datetimeFigureOut">
               <a:rPr lang="en-IN" smtClean="0"/>
-              <a:t>23-04-2021</a:t>
+              <a:t>06-05-2021</a:t>
             </a:fld>
             <a:endParaRPr lang="en-IN"/>
           </a:p>
@@ -5907,7 +5908,7 @@
             <a:fld id="{57E0CF6C-748E-4B7A-BC8B-3011EF78ED13}" type="datetime1">
               <a:rPr lang="en-US" smtClean="0"/>
               <a:pPr/>
-              <a:t>4/23/2021</a:t>
+              <a:t>5/6/2021</a:t>
             </a:fld>
             <a:endParaRPr lang="en-US" dirty="0"/>
           </a:p>
@@ -6768,6 +6769,1206 @@
     <p:extLst>
       <p:ext uri="{BB962C8B-B14F-4D97-AF65-F5344CB8AC3E}">
         <p14:creationId xmlns:p14="http://schemas.microsoft.com/office/powerpoint/2010/main" val="3573154129"/>
+      </p:ext>
+    </p:extLst>
+  </p:cSld>
+  <p:clrMapOvr>
+    <a:masterClrMapping/>
+  </p:clrMapOvr>
+</p:sld>
+</file>
+
+<file path=ppt/slides/slide11.xml><?xml version="1.0" encoding="utf-8"?>
+<p:sld xmlns:a="http://schemas.openxmlformats.org/drawingml/2006/main" xmlns:r="http://schemas.openxmlformats.org/officeDocument/2006/relationships" xmlns:p="http://schemas.openxmlformats.org/presentationml/2006/main">
+  <p:cSld>
+    <p:spTree>
+      <p:nvGrpSpPr>
+        <p:cNvPr id="1" name=""/>
+        <p:cNvGrpSpPr/>
+        <p:nvPr/>
+      </p:nvGrpSpPr>
+      <p:grpSpPr>
+        <a:xfrm>
+          <a:off x="0" y="0"/>
+          <a:ext cx="0" cy="0"/>
+          <a:chOff x="0" y="0"/>
+          <a:chExt cx="0" cy="0"/>
+        </a:xfrm>
+      </p:grpSpPr>
+      <p:sp>
+        <p:nvSpPr>
+          <p:cNvPr id="5" name="Rectangle: Rounded Corners 4">
+            <a:extLst>
+              <a:ext uri="{FF2B5EF4-FFF2-40B4-BE49-F238E27FC236}">
+                <a16:creationId xmlns:a16="http://schemas.microsoft.com/office/drawing/2014/main" id="{4173EC0B-6BE9-402F-8785-3BE908018D57}"/>
+              </a:ext>
+            </a:extLst>
+          </p:cNvPr>
+          <p:cNvSpPr/>
+          <p:nvPr/>
+        </p:nvSpPr>
+        <p:spPr>
+          <a:xfrm>
+            <a:off x="4231801" y="3044161"/>
+            <a:ext cx="2192756" cy="929687"/>
+          </a:xfrm>
+          <a:prstGeom prst="roundRect">
+            <a:avLst/>
+          </a:prstGeom>
+          <a:noFill/>
+        </p:spPr>
+        <p:style>
+          <a:lnRef idx="2">
+            <a:schemeClr val="accent1">
+              <a:shade val="50000"/>
+            </a:schemeClr>
+          </a:lnRef>
+          <a:fillRef idx="1">
+            <a:schemeClr val="accent1"/>
+          </a:fillRef>
+          <a:effectRef idx="0">
+            <a:schemeClr val="accent1"/>
+          </a:effectRef>
+          <a:fontRef idx="minor">
+            <a:schemeClr val="lt1"/>
+          </a:fontRef>
+        </p:style>
+        <p:txBody>
+          <a:bodyPr rtlCol="0" anchor="ctr"/>
+          <a:lstStyle/>
+          <a:p>
+            <a:pPr algn="ctr"/>
+            <a:r>
+              <a:rPr lang="en-IN" dirty="0">
+                <a:solidFill>
+                  <a:schemeClr val="tx1"/>
+                </a:solidFill>
+              </a:rPr>
+              <a:t>Communicating with Unity3d from Flutter</a:t>
+            </a:r>
+          </a:p>
+        </p:txBody>
+      </p:sp>
+      <p:sp>
+        <p:nvSpPr>
+          <p:cNvPr id="6" name="Rectangle: Rounded Corners 5">
+            <a:extLst>
+              <a:ext uri="{FF2B5EF4-FFF2-40B4-BE49-F238E27FC236}">
+                <a16:creationId xmlns:a16="http://schemas.microsoft.com/office/drawing/2014/main" id="{01A061B1-13EF-4F4B-A645-56DA72A63B69}"/>
+              </a:ext>
+            </a:extLst>
+          </p:cNvPr>
+          <p:cNvSpPr/>
+          <p:nvPr/>
+        </p:nvSpPr>
+        <p:spPr>
+          <a:xfrm>
+            <a:off x="1180938" y="1688065"/>
+            <a:ext cx="2192752" cy="929687"/>
+          </a:xfrm>
+          <a:prstGeom prst="roundRect">
+            <a:avLst/>
+          </a:prstGeom>
+          <a:noFill/>
+        </p:spPr>
+        <p:style>
+          <a:lnRef idx="2">
+            <a:schemeClr val="accent1">
+              <a:shade val="50000"/>
+            </a:schemeClr>
+          </a:lnRef>
+          <a:fillRef idx="1">
+            <a:schemeClr val="accent1"/>
+          </a:fillRef>
+          <a:effectRef idx="0">
+            <a:schemeClr val="accent1"/>
+          </a:effectRef>
+          <a:fontRef idx="minor">
+            <a:schemeClr val="lt1"/>
+          </a:fontRef>
+        </p:style>
+        <p:txBody>
+          <a:bodyPr rtlCol="0" anchor="ctr"/>
+          <a:lstStyle/>
+          <a:p>
+            <a:pPr algn="ctr"/>
+            <a:r>
+              <a:rPr lang="en-IN" dirty="0">
+                <a:solidFill>
+                  <a:schemeClr val="tx1"/>
+                </a:solidFill>
+              </a:rPr>
+              <a:t>User Authentication</a:t>
+            </a:r>
+          </a:p>
+        </p:txBody>
+      </p:sp>
+      <p:sp>
+        <p:nvSpPr>
+          <p:cNvPr id="8" name="Rectangle: Rounded Corners 7">
+            <a:extLst>
+              <a:ext uri="{FF2B5EF4-FFF2-40B4-BE49-F238E27FC236}">
+                <a16:creationId xmlns:a16="http://schemas.microsoft.com/office/drawing/2014/main" id="{17ACCA37-59AC-4609-82B3-6AB699DAA387}"/>
+              </a:ext>
+            </a:extLst>
+          </p:cNvPr>
+          <p:cNvSpPr/>
+          <p:nvPr/>
+        </p:nvSpPr>
+        <p:spPr>
+          <a:xfrm>
+            <a:off x="4231801" y="1688065"/>
+            <a:ext cx="2192756" cy="929687"/>
+          </a:xfrm>
+          <a:prstGeom prst="roundRect">
+            <a:avLst/>
+          </a:prstGeom>
+          <a:noFill/>
+        </p:spPr>
+        <p:style>
+          <a:lnRef idx="2">
+            <a:schemeClr val="accent1">
+              <a:shade val="50000"/>
+            </a:schemeClr>
+          </a:lnRef>
+          <a:fillRef idx="1">
+            <a:schemeClr val="accent1"/>
+          </a:fillRef>
+          <a:effectRef idx="0">
+            <a:schemeClr val="accent1"/>
+          </a:effectRef>
+          <a:fontRef idx="minor">
+            <a:schemeClr val="lt1"/>
+          </a:fontRef>
+        </p:style>
+        <p:txBody>
+          <a:bodyPr rtlCol="0" anchor="ctr"/>
+          <a:lstStyle/>
+          <a:p>
+            <a:pPr algn="ctr"/>
+            <a:r>
+              <a:rPr lang="en-IN" dirty="0">
+                <a:solidFill>
+                  <a:schemeClr val="tx1"/>
+                </a:solidFill>
+              </a:rPr>
+              <a:t>Retrieve available products</a:t>
+            </a:r>
+          </a:p>
+        </p:txBody>
+      </p:sp>
+      <p:sp>
+        <p:nvSpPr>
+          <p:cNvPr id="9" name="Rectangle: Rounded Corners 8">
+            <a:extLst>
+              <a:ext uri="{FF2B5EF4-FFF2-40B4-BE49-F238E27FC236}">
+                <a16:creationId xmlns:a16="http://schemas.microsoft.com/office/drawing/2014/main" id="{A9904F90-BBA2-4751-8026-49B9D8FCCE63}"/>
+              </a:ext>
+            </a:extLst>
+          </p:cNvPr>
+          <p:cNvSpPr/>
+          <p:nvPr/>
+        </p:nvSpPr>
+        <p:spPr>
+          <a:xfrm>
+            <a:off x="1180938" y="3044161"/>
+            <a:ext cx="2314610" cy="929687"/>
+          </a:xfrm>
+          <a:prstGeom prst="roundRect">
+            <a:avLst/>
+          </a:prstGeom>
+          <a:noFill/>
+        </p:spPr>
+        <p:style>
+          <a:lnRef idx="2">
+            <a:schemeClr val="accent1">
+              <a:shade val="50000"/>
+            </a:schemeClr>
+          </a:lnRef>
+          <a:fillRef idx="1">
+            <a:schemeClr val="accent1"/>
+          </a:fillRef>
+          <a:effectRef idx="0">
+            <a:schemeClr val="accent1"/>
+          </a:effectRef>
+          <a:fontRef idx="minor">
+            <a:schemeClr val="lt1"/>
+          </a:fontRef>
+        </p:style>
+        <p:txBody>
+          <a:bodyPr rtlCol="0" anchor="ctr"/>
+          <a:lstStyle/>
+          <a:p>
+            <a:pPr algn="ctr"/>
+            <a:r>
+              <a:rPr lang="en-IN" dirty="0">
+                <a:solidFill>
+                  <a:schemeClr val="tx1"/>
+                </a:solidFill>
+              </a:rPr>
+              <a:t>Showcasing products in AR and in 3d</a:t>
+            </a:r>
+          </a:p>
+        </p:txBody>
+      </p:sp>
+      <p:pic>
+        <p:nvPicPr>
+          <p:cNvPr id="11" name="Graphic 10" descr="Database with solid fill">
+            <a:extLst>
+              <a:ext uri="{FF2B5EF4-FFF2-40B4-BE49-F238E27FC236}">
+                <a16:creationId xmlns:a16="http://schemas.microsoft.com/office/drawing/2014/main" id="{449E2E60-24BE-4622-8243-7C13233C8A3B}"/>
+              </a:ext>
+            </a:extLst>
+          </p:cNvPr>
+          <p:cNvPicPr>
+            <a:picLocks noChangeAspect="1"/>
+          </p:cNvPicPr>
+          <p:nvPr/>
+        </p:nvPicPr>
+        <p:blipFill>
+          <a:blip r:embed="rId2">
+            <a:extLst>
+              <a:ext uri="{28A0092B-C50C-407E-A947-70E740481C1C}">
+                <a14:useLocalDpi xmlns:a14="http://schemas.microsoft.com/office/drawing/2010/main" val="0"/>
+              </a:ext>
+              <a:ext uri="{96DAC541-7B7A-43D3-8B79-37D633B846F1}">
+                <asvg:svgBlip xmlns:asvg="http://schemas.microsoft.com/office/drawing/2016/SVG/main" r:embed="rId3"/>
+              </a:ext>
+            </a:extLst>
+          </a:blip>
+          <a:stretch>
+            <a:fillRect/>
+          </a:stretch>
+        </p:blipFill>
+        <p:spPr>
+          <a:xfrm>
+            <a:off x="5137322" y="1070145"/>
+            <a:ext cx="381714" cy="381714"/>
+          </a:xfrm>
+          <a:prstGeom prst="rect">
+            <a:avLst/>
+          </a:prstGeom>
+        </p:spPr>
+      </p:pic>
+      <p:sp>
+        <p:nvSpPr>
+          <p:cNvPr id="12" name="Rectangle: Rounded Corners 11">
+            <a:extLst>
+              <a:ext uri="{FF2B5EF4-FFF2-40B4-BE49-F238E27FC236}">
+                <a16:creationId xmlns:a16="http://schemas.microsoft.com/office/drawing/2014/main" id="{3BCE3157-1048-410E-BF3E-A1D25A72E517}"/>
+              </a:ext>
+            </a:extLst>
+          </p:cNvPr>
+          <p:cNvSpPr/>
+          <p:nvPr/>
+        </p:nvSpPr>
+        <p:spPr>
+          <a:xfrm>
+            <a:off x="1180938" y="4521741"/>
+            <a:ext cx="2314610" cy="929687"/>
+          </a:xfrm>
+          <a:prstGeom prst="roundRect">
+            <a:avLst/>
+          </a:prstGeom>
+          <a:noFill/>
+        </p:spPr>
+        <p:style>
+          <a:lnRef idx="2">
+            <a:schemeClr val="accent1">
+              <a:shade val="50000"/>
+            </a:schemeClr>
+          </a:lnRef>
+          <a:fillRef idx="1">
+            <a:schemeClr val="accent1"/>
+          </a:fillRef>
+          <a:effectRef idx="0">
+            <a:schemeClr val="accent1"/>
+          </a:effectRef>
+          <a:fontRef idx="minor">
+            <a:schemeClr val="lt1"/>
+          </a:fontRef>
+        </p:style>
+        <p:txBody>
+          <a:bodyPr rtlCol="0" anchor="ctr"/>
+          <a:lstStyle/>
+          <a:p>
+            <a:pPr algn="ctr"/>
+            <a:r>
+              <a:rPr lang="en-IN" dirty="0">
+                <a:solidFill>
+                  <a:schemeClr val="tx1"/>
+                </a:solidFill>
+              </a:rPr>
+              <a:t>Update User’s Cart upon adding a product to it</a:t>
+            </a:r>
+          </a:p>
+        </p:txBody>
+      </p:sp>
+      <p:sp>
+        <p:nvSpPr>
+          <p:cNvPr id="13" name="Rectangle: Rounded Corners 12">
+            <a:extLst>
+              <a:ext uri="{FF2B5EF4-FFF2-40B4-BE49-F238E27FC236}">
+                <a16:creationId xmlns:a16="http://schemas.microsoft.com/office/drawing/2014/main" id="{7D8B8C72-B78C-4276-A5B6-0C9E3901C9E9}"/>
+              </a:ext>
+            </a:extLst>
+          </p:cNvPr>
+          <p:cNvSpPr/>
+          <p:nvPr/>
+        </p:nvSpPr>
+        <p:spPr>
+          <a:xfrm>
+            <a:off x="4188894" y="4521741"/>
+            <a:ext cx="2314609" cy="929687"/>
+          </a:xfrm>
+          <a:prstGeom prst="roundRect">
+            <a:avLst/>
+          </a:prstGeom>
+          <a:noFill/>
+        </p:spPr>
+        <p:style>
+          <a:lnRef idx="2">
+            <a:schemeClr val="accent1">
+              <a:shade val="50000"/>
+            </a:schemeClr>
+          </a:lnRef>
+          <a:fillRef idx="1">
+            <a:schemeClr val="accent1"/>
+          </a:fillRef>
+          <a:effectRef idx="0">
+            <a:schemeClr val="accent1"/>
+          </a:effectRef>
+          <a:fontRef idx="minor">
+            <a:schemeClr val="lt1"/>
+          </a:fontRef>
+        </p:style>
+        <p:txBody>
+          <a:bodyPr rtlCol="0" anchor="ctr"/>
+          <a:lstStyle/>
+          <a:p>
+            <a:pPr algn="ctr"/>
+            <a:r>
+              <a:rPr lang="en-IN" dirty="0">
+                <a:solidFill>
+                  <a:schemeClr val="tx1"/>
+                </a:solidFill>
+              </a:rPr>
+              <a:t>Update changes in cart and checkout </a:t>
+            </a:r>
+          </a:p>
+        </p:txBody>
+      </p:sp>
+      <p:cxnSp>
+        <p:nvCxnSpPr>
+          <p:cNvPr id="15" name="Straight Arrow Connector 14">
+            <a:extLst>
+              <a:ext uri="{FF2B5EF4-FFF2-40B4-BE49-F238E27FC236}">
+                <a16:creationId xmlns:a16="http://schemas.microsoft.com/office/drawing/2014/main" id="{C94CDEAC-4B4A-4C2E-A487-1F147BF2974B}"/>
+              </a:ext>
+            </a:extLst>
+          </p:cNvPr>
+          <p:cNvCxnSpPr>
+            <a:cxnSpLocks/>
+            <a:stCxn id="6" idx="3"/>
+            <a:endCxn id="8" idx="1"/>
+          </p:cNvCxnSpPr>
+          <p:nvPr/>
+        </p:nvCxnSpPr>
+        <p:spPr>
+          <a:xfrm>
+            <a:off x="3373690" y="2152909"/>
+            <a:ext cx="858111" cy="0"/>
+          </a:xfrm>
+          <a:prstGeom prst="straightConnector1">
+            <a:avLst/>
+          </a:prstGeom>
+          <a:ln>
+            <a:tailEnd type="triangle"/>
+          </a:ln>
+        </p:spPr>
+        <p:style>
+          <a:lnRef idx="3">
+            <a:schemeClr val="dk1"/>
+          </a:lnRef>
+          <a:fillRef idx="0">
+            <a:schemeClr val="dk1"/>
+          </a:fillRef>
+          <a:effectRef idx="2">
+            <a:schemeClr val="dk1"/>
+          </a:effectRef>
+          <a:fontRef idx="minor">
+            <a:schemeClr val="tx1"/>
+          </a:fontRef>
+        </p:style>
+      </p:cxnSp>
+      <p:cxnSp>
+        <p:nvCxnSpPr>
+          <p:cNvPr id="19" name="Straight Arrow Connector 18">
+            <a:extLst>
+              <a:ext uri="{FF2B5EF4-FFF2-40B4-BE49-F238E27FC236}">
+                <a16:creationId xmlns:a16="http://schemas.microsoft.com/office/drawing/2014/main" id="{530DDFE7-B1CF-4052-A2A1-2F3979D315B4}"/>
+              </a:ext>
+            </a:extLst>
+          </p:cNvPr>
+          <p:cNvCxnSpPr>
+            <a:cxnSpLocks/>
+            <a:stCxn id="8" idx="2"/>
+            <a:endCxn id="5" idx="0"/>
+          </p:cNvCxnSpPr>
+          <p:nvPr/>
+        </p:nvCxnSpPr>
+        <p:spPr>
+          <a:xfrm>
+            <a:off x="5328179" y="2617752"/>
+            <a:ext cx="0" cy="426409"/>
+          </a:xfrm>
+          <a:prstGeom prst="straightConnector1">
+            <a:avLst/>
+          </a:prstGeom>
+          <a:ln>
+            <a:tailEnd type="triangle"/>
+          </a:ln>
+        </p:spPr>
+        <p:style>
+          <a:lnRef idx="3">
+            <a:schemeClr val="dk1"/>
+          </a:lnRef>
+          <a:fillRef idx="0">
+            <a:schemeClr val="dk1"/>
+          </a:fillRef>
+          <a:effectRef idx="2">
+            <a:schemeClr val="dk1"/>
+          </a:effectRef>
+          <a:fontRef idx="minor">
+            <a:schemeClr val="tx1"/>
+          </a:fontRef>
+        </p:style>
+      </p:cxnSp>
+      <p:cxnSp>
+        <p:nvCxnSpPr>
+          <p:cNvPr id="28" name="Straight Arrow Connector 27">
+            <a:extLst>
+              <a:ext uri="{FF2B5EF4-FFF2-40B4-BE49-F238E27FC236}">
+                <a16:creationId xmlns:a16="http://schemas.microsoft.com/office/drawing/2014/main" id="{76A6A626-74B7-4DE9-982C-9C131709C7B5}"/>
+              </a:ext>
+            </a:extLst>
+          </p:cNvPr>
+          <p:cNvCxnSpPr>
+            <a:cxnSpLocks/>
+            <a:stCxn id="5" idx="1"/>
+            <a:endCxn id="9" idx="3"/>
+          </p:cNvCxnSpPr>
+          <p:nvPr/>
+        </p:nvCxnSpPr>
+        <p:spPr>
+          <a:xfrm flipH="1">
+            <a:off x="3495548" y="3509005"/>
+            <a:ext cx="736253" cy="0"/>
+          </a:xfrm>
+          <a:prstGeom prst="straightConnector1">
+            <a:avLst/>
+          </a:prstGeom>
+          <a:ln>
+            <a:tailEnd type="triangle"/>
+          </a:ln>
+        </p:spPr>
+        <p:style>
+          <a:lnRef idx="3">
+            <a:schemeClr val="dk1"/>
+          </a:lnRef>
+          <a:fillRef idx="0">
+            <a:schemeClr val="dk1"/>
+          </a:fillRef>
+          <a:effectRef idx="2">
+            <a:schemeClr val="dk1"/>
+          </a:effectRef>
+          <a:fontRef idx="minor">
+            <a:schemeClr val="tx1"/>
+          </a:fontRef>
+        </p:style>
+      </p:cxnSp>
+      <p:cxnSp>
+        <p:nvCxnSpPr>
+          <p:cNvPr id="33" name="Straight Arrow Connector 32">
+            <a:extLst>
+              <a:ext uri="{FF2B5EF4-FFF2-40B4-BE49-F238E27FC236}">
+                <a16:creationId xmlns:a16="http://schemas.microsoft.com/office/drawing/2014/main" id="{8F018F54-EA85-4EF9-9F53-071FE63B755C}"/>
+              </a:ext>
+            </a:extLst>
+          </p:cNvPr>
+          <p:cNvCxnSpPr>
+            <a:cxnSpLocks/>
+            <a:stCxn id="12" idx="3"/>
+            <a:endCxn id="13" idx="1"/>
+          </p:cNvCxnSpPr>
+          <p:nvPr/>
+        </p:nvCxnSpPr>
+        <p:spPr>
+          <a:xfrm>
+            <a:off x="3495548" y="4986585"/>
+            <a:ext cx="693346" cy="0"/>
+          </a:xfrm>
+          <a:prstGeom prst="straightConnector1">
+            <a:avLst/>
+          </a:prstGeom>
+          <a:ln>
+            <a:tailEnd type="triangle"/>
+          </a:ln>
+        </p:spPr>
+        <p:style>
+          <a:lnRef idx="3">
+            <a:schemeClr val="dk1"/>
+          </a:lnRef>
+          <a:fillRef idx="0">
+            <a:schemeClr val="dk1"/>
+          </a:fillRef>
+          <a:effectRef idx="2">
+            <a:schemeClr val="dk1"/>
+          </a:effectRef>
+          <a:fontRef idx="minor">
+            <a:schemeClr val="tx1"/>
+          </a:fontRef>
+        </p:style>
+      </p:cxnSp>
+      <p:cxnSp>
+        <p:nvCxnSpPr>
+          <p:cNvPr id="77" name="Straight Arrow Connector 76">
+            <a:extLst>
+              <a:ext uri="{FF2B5EF4-FFF2-40B4-BE49-F238E27FC236}">
+                <a16:creationId xmlns:a16="http://schemas.microsoft.com/office/drawing/2014/main" id="{AEA1D9B5-833A-40B4-89A5-186708D45D85}"/>
+              </a:ext>
+            </a:extLst>
+          </p:cNvPr>
+          <p:cNvCxnSpPr>
+            <a:cxnSpLocks/>
+            <a:stCxn id="9" idx="2"/>
+            <a:endCxn id="12" idx="0"/>
+          </p:cNvCxnSpPr>
+          <p:nvPr/>
+        </p:nvCxnSpPr>
+        <p:spPr>
+          <a:xfrm>
+            <a:off x="2338243" y="3973848"/>
+            <a:ext cx="0" cy="547893"/>
+          </a:xfrm>
+          <a:prstGeom prst="straightConnector1">
+            <a:avLst/>
+          </a:prstGeom>
+          <a:ln>
+            <a:tailEnd type="triangle"/>
+          </a:ln>
+        </p:spPr>
+        <p:style>
+          <a:lnRef idx="3">
+            <a:schemeClr val="dk1"/>
+          </a:lnRef>
+          <a:fillRef idx="0">
+            <a:schemeClr val="dk1"/>
+          </a:fillRef>
+          <a:effectRef idx="2">
+            <a:schemeClr val="dk1"/>
+          </a:effectRef>
+          <a:fontRef idx="minor">
+            <a:schemeClr val="tx1"/>
+          </a:fontRef>
+        </p:style>
+      </p:cxnSp>
+      <p:cxnSp>
+        <p:nvCxnSpPr>
+          <p:cNvPr id="83" name="Straight Arrow Connector 82">
+            <a:extLst>
+              <a:ext uri="{FF2B5EF4-FFF2-40B4-BE49-F238E27FC236}">
+                <a16:creationId xmlns:a16="http://schemas.microsoft.com/office/drawing/2014/main" id="{13E7785A-431D-4C2B-97EF-AE5CB1691894}"/>
+              </a:ext>
+            </a:extLst>
+          </p:cNvPr>
+          <p:cNvCxnSpPr>
+            <a:cxnSpLocks/>
+            <a:stCxn id="11" idx="2"/>
+            <a:endCxn id="8" idx="0"/>
+          </p:cNvCxnSpPr>
+          <p:nvPr/>
+        </p:nvCxnSpPr>
+        <p:spPr>
+          <a:xfrm>
+            <a:off x="5328179" y="1451859"/>
+            <a:ext cx="0" cy="236206"/>
+          </a:xfrm>
+          <a:prstGeom prst="straightConnector1">
+            <a:avLst/>
+          </a:prstGeom>
+          <a:ln>
+            <a:tailEnd type="triangle"/>
+          </a:ln>
+        </p:spPr>
+        <p:style>
+          <a:lnRef idx="3">
+            <a:schemeClr val="dk1"/>
+          </a:lnRef>
+          <a:fillRef idx="0">
+            <a:schemeClr val="dk1"/>
+          </a:fillRef>
+          <a:effectRef idx="2">
+            <a:schemeClr val="dk1"/>
+          </a:effectRef>
+          <a:fontRef idx="minor">
+            <a:schemeClr val="tx1"/>
+          </a:fontRef>
+        </p:style>
+      </p:cxnSp>
+      <p:pic>
+        <p:nvPicPr>
+          <p:cNvPr id="86" name="Graphic 85" descr="Database with solid fill">
+            <a:extLst>
+              <a:ext uri="{FF2B5EF4-FFF2-40B4-BE49-F238E27FC236}">
+                <a16:creationId xmlns:a16="http://schemas.microsoft.com/office/drawing/2014/main" id="{04A719F7-31EB-46D9-A4FB-BF58041E8024}"/>
+              </a:ext>
+            </a:extLst>
+          </p:cNvPr>
+          <p:cNvPicPr>
+            <a:picLocks noChangeAspect="1"/>
+          </p:cNvPicPr>
+          <p:nvPr/>
+        </p:nvPicPr>
+        <p:blipFill>
+          <a:blip r:embed="rId2">
+            <a:extLst>
+              <a:ext uri="{28A0092B-C50C-407E-A947-70E740481C1C}">
+                <a14:useLocalDpi xmlns:a14="http://schemas.microsoft.com/office/drawing/2010/main" val="0"/>
+              </a:ext>
+              <a:ext uri="{96DAC541-7B7A-43D3-8B79-37D633B846F1}">
+                <asvg:svgBlip xmlns:asvg="http://schemas.microsoft.com/office/drawing/2016/SVG/main" r:embed="rId3"/>
+              </a:ext>
+            </a:extLst>
+          </a:blip>
+          <a:stretch>
+            <a:fillRect/>
+          </a:stretch>
+        </p:blipFill>
+        <p:spPr>
+          <a:xfrm>
+            <a:off x="5155342" y="5779155"/>
+            <a:ext cx="381714" cy="381714"/>
+          </a:xfrm>
+          <a:prstGeom prst="rect">
+            <a:avLst/>
+          </a:prstGeom>
+        </p:spPr>
+      </p:pic>
+      <p:cxnSp>
+        <p:nvCxnSpPr>
+          <p:cNvPr id="87" name="Straight Arrow Connector 86">
+            <a:extLst>
+              <a:ext uri="{FF2B5EF4-FFF2-40B4-BE49-F238E27FC236}">
+                <a16:creationId xmlns:a16="http://schemas.microsoft.com/office/drawing/2014/main" id="{BB8E6DB1-7D73-44FA-B9F2-1614AEF11845}"/>
+              </a:ext>
+            </a:extLst>
+          </p:cNvPr>
+          <p:cNvCxnSpPr>
+            <a:cxnSpLocks/>
+            <a:stCxn id="86" idx="0"/>
+            <a:endCxn id="13" idx="2"/>
+          </p:cNvCxnSpPr>
+          <p:nvPr/>
+        </p:nvCxnSpPr>
+        <p:spPr>
+          <a:xfrm flipV="1">
+            <a:off x="5346199" y="5451428"/>
+            <a:ext cx="0" cy="327727"/>
+          </a:xfrm>
+          <a:prstGeom prst="straightConnector1">
+            <a:avLst/>
+          </a:prstGeom>
+          <a:ln>
+            <a:tailEnd type="triangle"/>
+          </a:ln>
+        </p:spPr>
+        <p:style>
+          <a:lnRef idx="3">
+            <a:schemeClr val="dk1"/>
+          </a:lnRef>
+          <a:fillRef idx="0">
+            <a:schemeClr val="dk1"/>
+          </a:fillRef>
+          <a:effectRef idx="2">
+            <a:schemeClr val="dk1"/>
+          </a:effectRef>
+          <a:fontRef idx="minor">
+            <a:schemeClr val="tx1"/>
+          </a:fontRef>
+        </p:style>
+      </p:cxnSp>
+      <p:pic>
+        <p:nvPicPr>
+          <p:cNvPr id="93" name="Graphic 92" descr="Database with solid fill">
+            <a:extLst>
+              <a:ext uri="{FF2B5EF4-FFF2-40B4-BE49-F238E27FC236}">
+                <a16:creationId xmlns:a16="http://schemas.microsoft.com/office/drawing/2014/main" id="{D2B2C440-8BB4-4011-8997-0C4969F05B9F}"/>
+              </a:ext>
+            </a:extLst>
+          </p:cNvPr>
+          <p:cNvPicPr>
+            <a:picLocks noChangeAspect="1"/>
+          </p:cNvPicPr>
+          <p:nvPr/>
+        </p:nvPicPr>
+        <p:blipFill>
+          <a:blip r:embed="rId2">
+            <a:extLst>
+              <a:ext uri="{28A0092B-C50C-407E-A947-70E740481C1C}">
+                <a14:useLocalDpi xmlns:a14="http://schemas.microsoft.com/office/drawing/2010/main" val="0"/>
+              </a:ext>
+              <a:ext uri="{96DAC541-7B7A-43D3-8B79-37D633B846F1}">
+                <asvg:svgBlip xmlns:asvg="http://schemas.microsoft.com/office/drawing/2016/SVG/main" r:embed="rId3"/>
+              </a:ext>
+            </a:extLst>
+          </a:blip>
+          <a:stretch>
+            <a:fillRect/>
+          </a:stretch>
+        </p:blipFill>
+        <p:spPr>
+          <a:xfrm>
+            <a:off x="2147386" y="5743796"/>
+            <a:ext cx="381714" cy="381714"/>
+          </a:xfrm>
+          <a:prstGeom prst="rect">
+            <a:avLst/>
+          </a:prstGeom>
+        </p:spPr>
+      </p:pic>
+      <p:cxnSp>
+        <p:nvCxnSpPr>
+          <p:cNvPr id="94" name="Straight Arrow Connector 93">
+            <a:extLst>
+              <a:ext uri="{FF2B5EF4-FFF2-40B4-BE49-F238E27FC236}">
+                <a16:creationId xmlns:a16="http://schemas.microsoft.com/office/drawing/2014/main" id="{BF6CE210-4ECE-47C7-9685-E00F3AF752EE}"/>
+              </a:ext>
+            </a:extLst>
+          </p:cNvPr>
+          <p:cNvCxnSpPr>
+            <a:cxnSpLocks/>
+            <a:stCxn id="93" idx="0"/>
+            <a:endCxn id="12" idx="2"/>
+          </p:cNvCxnSpPr>
+          <p:nvPr/>
+        </p:nvCxnSpPr>
+        <p:spPr>
+          <a:xfrm flipV="1">
+            <a:off x="2338243" y="5451428"/>
+            <a:ext cx="0" cy="292368"/>
+          </a:xfrm>
+          <a:prstGeom prst="straightConnector1">
+            <a:avLst/>
+          </a:prstGeom>
+          <a:ln>
+            <a:tailEnd type="triangle"/>
+          </a:ln>
+        </p:spPr>
+        <p:style>
+          <a:lnRef idx="3">
+            <a:schemeClr val="dk1"/>
+          </a:lnRef>
+          <a:fillRef idx="0">
+            <a:schemeClr val="dk1"/>
+          </a:fillRef>
+          <a:effectRef idx="2">
+            <a:schemeClr val="dk1"/>
+          </a:effectRef>
+          <a:fontRef idx="minor">
+            <a:schemeClr val="tx1"/>
+          </a:fontRef>
+        </p:style>
+      </p:cxnSp>
+      <p:sp>
+        <p:nvSpPr>
+          <p:cNvPr id="96" name="Rectangle: Rounded Corners 95">
+            <a:extLst>
+              <a:ext uri="{FF2B5EF4-FFF2-40B4-BE49-F238E27FC236}">
+                <a16:creationId xmlns:a16="http://schemas.microsoft.com/office/drawing/2014/main" id="{3F517E2E-54FA-4D84-9879-29395A7B2A0B}"/>
+              </a:ext>
+            </a:extLst>
+          </p:cNvPr>
+          <p:cNvSpPr/>
+          <p:nvPr/>
+        </p:nvSpPr>
+        <p:spPr>
+          <a:xfrm>
+            <a:off x="156856" y="523783"/>
+            <a:ext cx="7039993" cy="5964813"/>
+          </a:xfrm>
+          <a:prstGeom prst="roundRect">
+            <a:avLst/>
+          </a:prstGeom>
+          <a:noFill/>
+        </p:spPr>
+        <p:style>
+          <a:lnRef idx="2">
+            <a:schemeClr val="accent1">
+              <a:shade val="50000"/>
+            </a:schemeClr>
+          </a:lnRef>
+          <a:fillRef idx="1">
+            <a:schemeClr val="accent1"/>
+          </a:fillRef>
+          <a:effectRef idx="0">
+            <a:schemeClr val="accent1"/>
+          </a:effectRef>
+          <a:fontRef idx="minor">
+            <a:schemeClr val="lt1"/>
+          </a:fontRef>
+        </p:style>
+        <p:txBody>
+          <a:bodyPr rtlCol="0" anchor="ctr"/>
+          <a:lstStyle/>
+          <a:p>
+            <a:pPr algn="ctr"/>
+            <a:endParaRPr lang="en-IN" dirty="0">
+              <a:solidFill>
+                <a:schemeClr val="tx1"/>
+              </a:solidFill>
+            </a:endParaRPr>
+          </a:p>
+        </p:txBody>
+      </p:sp>
+      <p:sp>
+        <p:nvSpPr>
+          <p:cNvPr id="98" name="Rectangle: Rounded Corners 97">
+            <a:extLst>
+              <a:ext uri="{FF2B5EF4-FFF2-40B4-BE49-F238E27FC236}">
+                <a16:creationId xmlns:a16="http://schemas.microsoft.com/office/drawing/2014/main" id="{85E5D676-8719-4C7B-B607-23D1BBD6F092}"/>
+              </a:ext>
+            </a:extLst>
+          </p:cNvPr>
+          <p:cNvSpPr/>
+          <p:nvPr/>
+        </p:nvSpPr>
+        <p:spPr>
+          <a:xfrm>
+            <a:off x="8617313" y="1560950"/>
+            <a:ext cx="2045642" cy="929687"/>
+          </a:xfrm>
+          <a:prstGeom prst="roundRect">
+            <a:avLst/>
+          </a:prstGeom>
+          <a:noFill/>
+        </p:spPr>
+        <p:style>
+          <a:lnRef idx="2">
+            <a:schemeClr val="accent1">
+              <a:shade val="50000"/>
+            </a:schemeClr>
+          </a:lnRef>
+          <a:fillRef idx="1">
+            <a:schemeClr val="accent1"/>
+          </a:fillRef>
+          <a:effectRef idx="0">
+            <a:schemeClr val="accent1"/>
+          </a:effectRef>
+          <a:fontRef idx="minor">
+            <a:schemeClr val="lt1"/>
+          </a:fontRef>
+        </p:style>
+        <p:txBody>
+          <a:bodyPr rtlCol="0" anchor="ctr"/>
+          <a:lstStyle/>
+          <a:p>
+            <a:pPr algn="ctr"/>
+            <a:r>
+              <a:rPr lang="en-IN" dirty="0">
+                <a:solidFill>
+                  <a:schemeClr val="tx1"/>
+                </a:solidFill>
+              </a:rPr>
+              <a:t>Horizontal Plane Detection</a:t>
+            </a:r>
+          </a:p>
+        </p:txBody>
+      </p:sp>
+      <p:sp>
+        <p:nvSpPr>
+          <p:cNvPr id="99" name="Rectangle: Rounded Corners 98">
+            <a:extLst>
+              <a:ext uri="{FF2B5EF4-FFF2-40B4-BE49-F238E27FC236}">
+                <a16:creationId xmlns:a16="http://schemas.microsoft.com/office/drawing/2014/main" id="{CC921967-E6F3-4E02-8761-2A4198BCDC0F}"/>
+              </a:ext>
+            </a:extLst>
+          </p:cNvPr>
+          <p:cNvSpPr/>
+          <p:nvPr/>
+        </p:nvSpPr>
+        <p:spPr>
+          <a:xfrm>
+            <a:off x="8617313" y="3041345"/>
+            <a:ext cx="2045642" cy="929687"/>
+          </a:xfrm>
+          <a:prstGeom prst="roundRect">
+            <a:avLst/>
+          </a:prstGeom>
+          <a:noFill/>
+        </p:spPr>
+        <p:style>
+          <a:lnRef idx="2">
+            <a:schemeClr val="accent1">
+              <a:shade val="50000"/>
+            </a:schemeClr>
+          </a:lnRef>
+          <a:fillRef idx="1">
+            <a:schemeClr val="accent1"/>
+          </a:fillRef>
+          <a:effectRef idx="0">
+            <a:schemeClr val="accent1"/>
+          </a:effectRef>
+          <a:fontRef idx="minor">
+            <a:schemeClr val="lt1"/>
+          </a:fontRef>
+        </p:style>
+        <p:txBody>
+          <a:bodyPr rtlCol="0" anchor="ctr"/>
+          <a:lstStyle/>
+          <a:p>
+            <a:pPr algn="ctr"/>
+            <a:r>
+              <a:rPr lang="en-IN" dirty="0">
+                <a:solidFill>
+                  <a:schemeClr val="tx1"/>
+                </a:solidFill>
+              </a:rPr>
+              <a:t>Vertical Plane Detection</a:t>
+            </a:r>
+          </a:p>
+        </p:txBody>
+      </p:sp>
+      <p:sp>
+        <p:nvSpPr>
+          <p:cNvPr id="100" name="Rectangle: Rounded Corners 99">
+            <a:extLst>
+              <a:ext uri="{FF2B5EF4-FFF2-40B4-BE49-F238E27FC236}">
+                <a16:creationId xmlns:a16="http://schemas.microsoft.com/office/drawing/2014/main" id="{8ABD0738-C96C-481A-A34D-B97CF1836A56}"/>
+              </a:ext>
+            </a:extLst>
+          </p:cNvPr>
+          <p:cNvSpPr/>
+          <p:nvPr/>
+        </p:nvSpPr>
+        <p:spPr>
+          <a:xfrm>
+            <a:off x="8617313" y="4521740"/>
+            <a:ext cx="2045642" cy="929687"/>
+          </a:xfrm>
+          <a:prstGeom prst="roundRect">
+            <a:avLst/>
+          </a:prstGeom>
+          <a:noFill/>
+        </p:spPr>
+        <p:style>
+          <a:lnRef idx="2">
+            <a:schemeClr val="accent1">
+              <a:shade val="50000"/>
+            </a:schemeClr>
+          </a:lnRef>
+          <a:fillRef idx="1">
+            <a:schemeClr val="accent1"/>
+          </a:fillRef>
+          <a:effectRef idx="0">
+            <a:schemeClr val="accent1"/>
+          </a:effectRef>
+          <a:fontRef idx="minor">
+            <a:schemeClr val="lt1"/>
+          </a:fontRef>
+        </p:style>
+        <p:txBody>
+          <a:bodyPr rtlCol="0" anchor="ctr"/>
+          <a:lstStyle/>
+          <a:p>
+            <a:pPr algn="ctr"/>
+            <a:r>
+              <a:rPr lang="en-IN" dirty="0">
+                <a:solidFill>
+                  <a:schemeClr val="tx1"/>
+                </a:solidFill>
+              </a:rPr>
+              <a:t>Face Tracking</a:t>
+            </a:r>
+          </a:p>
+        </p:txBody>
+      </p:sp>
+      <p:cxnSp>
+        <p:nvCxnSpPr>
+          <p:cNvPr id="225" name="Straight Arrow Connector 224">
+            <a:extLst>
+              <a:ext uri="{FF2B5EF4-FFF2-40B4-BE49-F238E27FC236}">
+                <a16:creationId xmlns:a16="http://schemas.microsoft.com/office/drawing/2014/main" id="{32546BE8-9CB9-490F-AA5C-458F753EA88C}"/>
+              </a:ext>
+            </a:extLst>
+          </p:cNvPr>
+          <p:cNvCxnSpPr>
+            <a:cxnSpLocks/>
+            <a:stCxn id="5" idx="3"/>
+            <a:endCxn id="96" idx="3"/>
+          </p:cNvCxnSpPr>
+          <p:nvPr/>
+        </p:nvCxnSpPr>
+        <p:spPr>
+          <a:xfrm flipV="1">
+            <a:off x="6424557" y="3506190"/>
+            <a:ext cx="772292" cy="2815"/>
+          </a:xfrm>
+          <a:prstGeom prst="straightConnector1">
+            <a:avLst/>
+          </a:prstGeom>
+          <a:ln>
+            <a:tailEnd type="triangle"/>
+          </a:ln>
+        </p:spPr>
+        <p:style>
+          <a:lnRef idx="3">
+            <a:schemeClr val="dk1"/>
+          </a:lnRef>
+          <a:fillRef idx="0">
+            <a:schemeClr val="dk1"/>
+          </a:fillRef>
+          <a:effectRef idx="2">
+            <a:schemeClr val="dk1"/>
+          </a:effectRef>
+          <a:fontRef idx="minor">
+            <a:schemeClr val="tx1"/>
+          </a:fontRef>
+        </p:style>
+      </p:cxnSp>
+      <p:cxnSp>
+        <p:nvCxnSpPr>
+          <p:cNvPr id="229" name="Straight Arrow Connector 228">
+            <a:extLst>
+              <a:ext uri="{FF2B5EF4-FFF2-40B4-BE49-F238E27FC236}">
+                <a16:creationId xmlns:a16="http://schemas.microsoft.com/office/drawing/2014/main" id="{F9ACEFF9-FD2B-4967-9D67-FC8C5C84936A}"/>
+              </a:ext>
+            </a:extLst>
+          </p:cNvPr>
+          <p:cNvCxnSpPr>
+            <a:cxnSpLocks/>
+            <a:stCxn id="96" idx="3"/>
+            <a:endCxn id="98" idx="1"/>
+          </p:cNvCxnSpPr>
+          <p:nvPr/>
+        </p:nvCxnSpPr>
+        <p:spPr>
+          <a:xfrm flipV="1">
+            <a:off x="7196849" y="2025794"/>
+            <a:ext cx="1420464" cy="1480396"/>
+          </a:xfrm>
+          <a:prstGeom prst="straightConnector1">
+            <a:avLst/>
+          </a:prstGeom>
+          <a:ln>
+            <a:tailEnd type="triangle"/>
+          </a:ln>
+        </p:spPr>
+        <p:style>
+          <a:lnRef idx="3">
+            <a:schemeClr val="dk1"/>
+          </a:lnRef>
+          <a:fillRef idx="0">
+            <a:schemeClr val="dk1"/>
+          </a:fillRef>
+          <a:effectRef idx="2">
+            <a:schemeClr val="dk1"/>
+          </a:effectRef>
+          <a:fontRef idx="minor">
+            <a:schemeClr val="tx1"/>
+          </a:fontRef>
+        </p:style>
+      </p:cxnSp>
+      <p:cxnSp>
+        <p:nvCxnSpPr>
+          <p:cNvPr id="231" name="Straight Arrow Connector 230">
+            <a:extLst>
+              <a:ext uri="{FF2B5EF4-FFF2-40B4-BE49-F238E27FC236}">
+                <a16:creationId xmlns:a16="http://schemas.microsoft.com/office/drawing/2014/main" id="{850AF412-5534-4309-BD1D-012FDD3DBB2F}"/>
+              </a:ext>
+            </a:extLst>
+          </p:cNvPr>
+          <p:cNvCxnSpPr>
+            <a:cxnSpLocks/>
+            <a:stCxn id="96" idx="3"/>
+            <a:endCxn id="99" idx="1"/>
+          </p:cNvCxnSpPr>
+          <p:nvPr/>
+        </p:nvCxnSpPr>
+        <p:spPr>
+          <a:xfrm flipV="1">
+            <a:off x="7196849" y="3506189"/>
+            <a:ext cx="1420464" cy="1"/>
+          </a:xfrm>
+          <a:prstGeom prst="straightConnector1">
+            <a:avLst/>
+          </a:prstGeom>
+          <a:ln>
+            <a:tailEnd type="triangle"/>
+          </a:ln>
+        </p:spPr>
+        <p:style>
+          <a:lnRef idx="3">
+            <a:schemeClr val="dk1"/>
+          </a:lnRef>
+          <a:fillRef idx="0">
+            <a:schemeClr val="dk1"/>
+          </a:fillRef>
+          <a:effectRef idx="2">
+            <a:schemeClr val="dk1"/>
+          </a:effectRef>
+          <a:fontRef idx="minor">
+            <a:schemeClr val="tx1"/>
+          </a:fontRef>
+        </p:style>
+      </p:cxnSp>
+      <p:cxnSp>
+        <p:nvCxnSpPr>
+          <p:cNvPr id="233" name="Straight Arrow Connector 232">
+            <a:extLst>
+              <a:ext uri="{FF2B5EF4-FFF2-40B4-BE49-F238E27FC236}">
+                <a16:creationId xmlns:a16="http://schemas.microsoft.com/office/drawing/2014/main" id="{BF2719D7-6B06-47F2-B7B3-30B49AA49D3F}"/>
+              </a:ext>
+            </a:extLst>
+          </p:cNvPr>
+          <p:cNvCxnSpPr>
+            <a:cxnSpLocks/>
+            <a:stCxn id="96" idx="3"/>
+            <a:endCxn id="100" idx="1"/>
+          </p:cNvCxnSpPr>
+          <p:nvPr/>
+        </p:nvCxnSpPr>
+        <p:spPr>
+          <a:xfrm>
+            <a:off x="7196849" y="3506190"/>
+            <a:ext cx="1420464" cy="1480394"/>
+          </a:xfrm>
+          <a:prstGeom prst="straightConnector1">
+            <a:avLst/>
+          </a:prstGeom>
+          <a:ln>
+            <a:tailEnd type="triangle"/>
+          </a:ln>
+        </p:spPr>
+        <p:style>
+          <a:lnRef idx="3">
+            <a:schemeClr val="dk1"/>
+          </a:lnRef>
+          <a:fillRef idx="0">
+            <a:schemeClr val="dk1"/>
+          </a:fillRef>
+          <a:effectRef idx="2">
+            <a:schemeClr val="dk1"/>
+          </a:effectRef>
+          <a:fontRef idx="minor">
+            <a:schemeClr val="tx1"/>
+          </a:fontRef>
+        </p:style>
+      </p:cxnSp>
+    </p:spTree>
+    <p:extLst>
+      <p:ext uri="{BB962C8B-B14F-4D97-AF65-F5344CB8AC3E}">
+        <p14:creationId xmlns:p14="http://schemas.microsoft.com/office/powerpoint/2010/main" val="629221123"/>
       </p:ext>
     </p:extLst>
   </p:cSld>

</xml_diff>